<commit_message>
Finished up Wettbewerb und Kartellbildung
</commit_message>
<xml_diff>
--- a/Wirtschaft/KI/Wettbewerb und Kartellbildung/Wettbewerb und Kartellbildung.pptx
+++ b/Wirtschaft/KI/Wettbewerb und Kartellbildung/Wettbewerb und Kartellbildung.pptx
@@ -5,17 +5,18 @@
     <p:sldMasterId id="2147483746" r:id="rId1"/>
   </p:sldMasterIdLst>
   <p:notesMasterIdLst>
-    <p:notesMasterId r:id="rId7"/>
+    <p:notesMasterId r:id="rId8"/>
   </p:notesMasterIdLst>
   <p:handoutMasterIdLst>
-    <p:handoutMasterId r:id="rId8"/>
+    <p:handoutMasterId r:id="rId9"/>
   </p:handoutMasterIdLst>
   <p:sldIdLst>
     <p:sldId id="257" r:id="rId2"/>
     <p:sldId id="263" r:id="rId3"/>
     <p:sldId id="262" r:id="rId4"/>
-    <p:sldId id="264" r:id="rId5"/>
-    <p:sldId id="259" r:id="rId6"/>
+    <p:sldId id="265" r:id="rId5"/>
+    <p:sldId id="264" r:id="rId6"/>
+    <p:sldId id="259" r:id="rId7"/>
   </p:sldIdLst>
   <p:sldSz cx="12192000" cy="6858000"/>
   <p:notesSz cx="6858000" cy="9144000"/>
@@ -209,7 +210,7 @@
             <a:pPr rtl="0"/>
             <a:fld id="{7260543F-C6AC-4A94-9181-2A0B47128E40}" type="datetime1">
               <a:rPr lang="de-DE" smtClean="0"/>
-              <a:t>15.11.2024</a:t>
+              <a:t>21.11.2024</a:t>
             </a:fld>
             <a:endParaRPr lang="en-US" dirty="0"/>
           </a:p>
@@ -379,7 +380,7 @@
             <a:pPr rtl="0"/>
             <a:fld id="{BB4411EF-09CB-4E62-A9ED-59F7AB2BB401}" type="datetime1">
               <a:rPr lang="de-DE" smtClean="0"/>
-              <a:t>15.11.2024</a:t>
+              <a:t>21.11.2024</a:t>
             </a:fld>
             <a:endParaRPr lang="en-US"/>
           </a:p>
@@ -899,7 +900,7 @@
             <a:pPr rtl="0"/>
             <a:fld id="{D058F8EF-9461-4DB5-8DE8-65F0C8AF5E0D}" type="datetime1">
               <a:rPr lang="de-DE" smtClean="0"/>
-              <a:t>15.11.2024</a:t>
+              <a:t>21.11.2024</a:t>
             </a:fld>
             <a:endParaRPr lang="en-US" dirty="0"/>
           </a:p>
@@ -1091,7 +1092,7 @@
             <a:pPr rtl="0"/>
             <a:fld id="{A4B84E5B-C9E8-4DB6-BA34-0E271B709DFA}" type="datetime1">
               <a:rPr lang="de-DE" smtClean="0"/>
-              <a:t>15.11.2024</a:t>
+              <a:t>21.11.2024</a:t>
             </a:fld>
             <a:endParaRPr lang="en-US" dirty="0"/>
           </a:p>
@@ -1337,7 +1338,7 @@
             <a:pPr rtl="0"/>
             <a:fld id="{F650C74D-3EC7-4807-8009-B91685601A76}" type="datetime1">
               <a:rPr lang="de-DE" smtClean="0"/>
-              <a:t>15.11.2024</a:t>
+              <a:t>21.11.2024</a:t>
             </a:fld>
             <a:endParaRPr lang="en-US" dirty="0"/>
           </a:p>
@@ -1529,7 +1530,7 @@
             <a:pPr rtl="0"/>
             <a:fld id="{CA5E3BD6-493E-4773-AC13-EE70A9E3F498}" type="datetime1">
               <a:rPr lang="de-DE" smtClean="0"/>
-              <a:t>15.11.2024</a:t>
+              <a:t>21.11.2024</a:t>
             </a:fld>
             <a:endParaRPr lang="en-US" dirty="0"/>
           </a:p>
@@ -1906,7 +1907,7 @@
             <a:pPr rtl="0"/>
             <a:fld id="{FEE6A76B-C923-49BD-ABE7-ADE768C6F571}" type="datetime1">
               <a:rPr lang="de-DE" smtClean="0"/>
-              <a:t>15.11.2024</a:t>
+              <a:t>21.11.2024</a:t>
             </a:fld>
             <a:endParaRPr lang="en-US" dirty="0"/>
           </a:p>
@@ -2165,7 +2166,7 @@
             <a:pPr rtl="0"/>
             <a:fld id="{4CD334EC-5459-4A98-AF88-01FD6D7BAF68}" type="datetime1">
               <a:rPr lang="de-DE" smtClean="0"/>
-              <a:t>15.11.2024</a:t>
+              <a:t>21.11.2024</a:t>
             </a:fld>
             <a:endParaRPr lang="en-US" dirty="0"/>
           </a:p>
@@ -2566,7 +2567,7 @@
             <a:pPr rtl="0"/>
             <a:fld id="{62F56688-ED28-473C-871E-9EEF4BB0D1F0}" type="datetime1">
               <a:rPr lang="de-DE" smtClean="0"/>
-              <a:t>15.11.2024</a:t>
+              <a:t>21.11.2024</a:t>
             </a:fld>
             <a:endParaRPr lang="en-US" dirty="0"/>
           </a:p>
@@ -2706,7 +2707,7 @@
             <a:pPr rtl="0"/>
             <a:fld id="{F9110680-7D80-41F3-804A-113A4CB11D73}" type="datetime1">
               <a:rPr lang="de-DE" smtClean="0"/>
-              <a:t>15.11.2024</a:t>
+              <a:t>21.11.2024</a:t>
             </a:fld>
             <a:endParaRPr lang="en-US" dirty="0"/>
           </a:p>
@@ -2866,7 +2867,7 @@
             <a:pPr rtl="0"/>
             <a:fld id="{7E7F7112-C41D-45A5-B762-BC15064583EE}" type="datetime1">
               <a:rPr lang="de-DE" smtClean="0"/>
-              <a:t>15.11.2024</a:t>
+              <a:t>21.11.2024</a:t>
             </a:fld>
             <a:endParaRPr lang="en-US" dirty="0"/>
           </a:p>
@@ -3199,7 +3200,7 @@
             <a:pPr rtl="0"/>
             <a:fld id="{1CFE5CD5-4320-48E9-85AB-4E68C78D0837}" type="datetime1">
               <a:rPr lang="de-DE" smtClean="0"/>
-              <a:t>15.11.2024</a:t>
+              <a:t>21.11.2024</a:t>
             </a:fld>
             <a:endParaRPr lang="en-US" dirty="0"/>
           </a:p>
@@ -3554,7 +3555,7 @@
             <a:pPr rtl="0"/>
             <a:fld id="{4B989E5A-44CF-486A-A324-E4C01361A073}" type="datetime1">
               <a:rPr lang="de-DE" smtClean="0"/>
-              <a:t>15.11.2024</a:t>
+              <a:t>21.11.2024</a:t>
             </a:fld>
             <a:endParaRPr lang="en-US" dirty="0"/>
           </a:p>
@@ -3818,7 +3819,7 @@
             <a:pPr rtl="0"/>
             <a:fld id="{C5518B76-3D47-40C3-B678-8969E3806FFF}" type="datetime1">
               <a:rPr lang="de-DE" smtClean="0"/>
-              <a:t>15.11.2024</a:t>
+              <a:t>21.11.2024</a:t>
             </a:fld>
             <a:endParaRPr lang="en-US" dirty="0"/>
           </a:p>
@@ -4705,7 +4706,7 @@
             <a:pPr rtl="0"/>
             <a:fld id="{CA5E3BD6-493E-4773-AC13-EE70A9E3F498}" type="datetime1">
               <a:rPr lang="de-DE" smtClean="0"/>
-              <a:t>15.11.2024</a:t>
+              <a:t>21.11.2024</a:t>
             </a:fld>
             <a:endParaRPr lang="en-US" dirty="0"/>
           </a:p>
@@ -4842,7 +4843,7 @@
             <a:pPr rtl="0"/>
             <a:fld id="{CA5E3BD6-493E-4773-AC13-EE70A9E3F498}" type="datetime1">
               <a:rPr lang="de-DE" smtClean="0"/>
-              <a:t>15.11.2024</a:t>
+              <a:t>21.11.2024</a:t>
             </a:fld>
             <a:endParaRPr lang="en-US" dirty="0"/>
           </a:p>
@@ -5138,7 +5139,7 @@
           <p:cNvPr id="2" name="Title 1">
             <a:extLst>
               <a:ext uri="{FF2B5EF4-FFF2-40B4-BE49-F238E27FC236}">
-                <a16:creationId xmlns:a16="http://schemas.microsoft.com/office/drawing/2014/main" id="{B84CFA06-281C-1BB8-D929-632EED88D285}"/>
+                <a16:creationId xmlns:a16="http://schemas.microsoft.com/office/drawing/2014/main" id="{F8E65B6C-6573-4C95-F37A-095A7DF2B68F}"/>
               </a:ext>
             </a:extLst>
           </p:cNvPr>
@@ -5146,7 +5147,7 @@
             <a:spLocks noGrp="1"/>
           </p:cNvSpPr>
           <p:nvPr>
-            <p:ph type="ctrTitle"/>
+            <p:ph type="title"/>
           </p:nvPr>
         </p:nvSpPr>
         <p:spPr/>
@@ -5156,17 +5157,17 @@
           <a:p>
             <a:r>
               <a:rPr lang="de-DE" dirty="0"/>
-              <a:t>Warum brauchen wir Wettbewerb?</a:t>
-            </a:r>
-          </a:p>
-        </p:txBody>
-      </p:sp>
-      <p:sp>
-        <p:nvSpPr>
-          <p:cNvPr id="3" name="Subtitle 2">
+              <a:t>Google bald ohne Chrome?</a:t>
+            </a:r>
+          </a:p>
+        </p:txBody>
+      </p:sp>
+      <p:sp>
+        <p:nvSpPr>
+          <p:cNvPr id="4" name="Date Placeholder 3">
             <a:extLst>
               <a:ext uri="{FF2B5EF4-FFF2-40B4-BE49-F238E27FC236}">
-                <a16:creationId xmlns:a16="http://schemas.microsoft.com/office/drawing/2014/main" id="{12AEE784-99A4-771C-F303-4987F6073675}"/>
+                <a16:creationId xmlns:a16="http://schemas.microsoft.com/office/drawing/2014/main" id="{FC28692F-4C5A-C02C-F05A-C76CEE1D2D0A}"/>
               </a:ext>
             </a:extLst>
           </p:cNvPr>
@@ -5174,7 +5175,7 @@
             <a:spLocks noGrp="1"/>
           </p:cNvSpPr>
           <p:nvPr>
-            <p:ph type="subTitle" idx="1"/>
+            <p:ph type="dt" sz="half" idx="10"/>
           </p:nvPr>
         </p:nvSpPr>
         <p:spPr/>
@@ -5182,16 +5183,21 @@
           <a:bodyPr/>
           <a:lstStyle/>
           <a:p>
-            <a:endParaRPr lang="de-DE"/>
-          </a:p>
-        </p:txBody>
-      </p:sp>
-      <p:sp>
-        <p:nvSpPr>
-          <p:cNvPr id="4" name="Date Placeholder 3">
+            <a:pPr rtl="0"/>
+            <a:fld id="{CA5E3BD6-493E-4773-AC13-EE70A9E3F498}" type="datetime1">
+              <a:rPr lang="de-DE" smtClean="0"/>
+              <a:t>21.11.2024</a:t>
+            </a:fld>
+            <a:endParaRPr lang="en-US" dirty="0"/>
+          </a:p>
+        </p:txBody>
+      </p:sp>
+      <p:sp>
+        <p:nvSpPr>
+          <p:cNvPr id="8" name="Content Placeholder 7">
             <a:extLst>
               <a:ext uri="{FF2B5EF4-FFF2-40B4-BE49-F238E27FC236}">
-                <a16:creationId xmlns:a16="http://schemas.microsoft.com/office/drawing/2014/main" id="{AD118D60-AE24-520D-F280-025EB9CFDEC5}"/>
+                <a16:creationId xmlns:a16="http://schemas.microsoft.com/office/drawing/2014/main" id="{F7448F80-6031-0529-5A9C-9155002C7BE4}"/>
               </a:ext>
             </a:extLst>
           </p:cNvPr>
@@ -5199,27 +5205,60 @@
             <a:spLocks noGrp="1"/>
           </p:cNvSpPr>
           <p:nvPr>
-            <p:ph type="dt" sz="half" idx="10"/>
-          </p:nvPr>
-        </p:nvSpPr>
-        <p:spPr/>
+            <p:ph idx="1"/>
+          </p:nvPr>
+        </p:nvSpPr>
+        <p:spPr>
+          <a:xfrm>
+            <a:off x="1097280" y="2108201"/>
+            <a:ext cx="6031431" cy="3760891"/>
+          </a:xfrm>
+        </p:spPr>
         <p:txBody>
           <a:bodyPr/>
           <a:lstStyle/>
           <a:p>
-            <a:pPr rtl="0"/>
-            <a:fld id="{D058F8EF-9461-4DB5-8DE8-65F0C8AF5E0D}" type="datetime1">
-              <a:rPr lang="de-DE" smtClean="0"/>
-              <a:t>15.11.2024</a:t>
-            </a:fld>
-            <a:endParaRPr lang="en-US" dirty="0"/>
-          </a:p>
-        </p:txBody>
-      </p:sp>
+            <a:r>
+              <a:rPr lang="de-DE" dirty="0"/>
+              <a:t>Angenommen, Google wäre eine deutsche Firma, wie würde das Bundeskartellamt entscheiden?</a:t>
+            </a:r>
+          </a:p>
+        </p:txBody>
+      </p:sp>
+      <p:pic>
+        <p:nvPicPr>
+          <p:cNvPr id="14" name="Picture 13">
+            <a:extLst>
+              <a:ext uri="{FF2B5EF4-FFF2-40B4-BE49-F238E27FC236}">
+                <a16:creationId xmlns:a16="http://schemas.microsoft.com/office/drawing/2014/main" id="{DC36DC53-8CC5-C4C8-0FC4-8E67D7837C93}"/>
+              </a:ext>
+            </a:extLst>
+          </p:cNvPr>
+          <p:cNvPicPr>
+            <a:picLocks noChangeAspect="1"/>
+          </p:cNvPicPr>
+          <p:nvPr/>
+        </p:nvPicPr>
+        <p:blipFill>
+          <a:blip r:embed="rId2"/>
+          <a:stretch>
+            <a:fillRect/>
+          </a:stretch>
+        </p:blipFill>
+        <p:spPr>
+          <a:xfrm>
+            <a:off x="7335672" y="2036644"/>
+            <a:ext cx="3926290" cy="3926290"/>
+          </a:xfrm>
+          <a:prstGeom prst="rect">
+            <a:avLst/>
+          </a:prstGeom>
+        </p:spPr>
+      </p:pic>
     </p:spTree>
     <p:extLst>
       <p:ext uri="{BB962C8B-B14F-4D97-AF65-F5344CB8AC3E}">
-        <p14:creationId xmlns:p14="http://schemas.microsoft.com/office/powerpoint/2010/main" val="212380936"/>
+        <p14:creationId xmlns:p14="http://schemas.microsoft.com/office/powerpoint/2010/main" val="636114735"/>
       </p:ext>
     </p:extLst>
   </p:cSld>
@@ -5251,6 +5290,119 @@
           <p:cNvPr id="2" name="Title 1">
             <a:extLst>
               <a:ext uri="{FF2B5EF4-FFF2-40B4-BE49-F238E27FC236}">
+                <a16:creationId xmlns:a16="http://schemas.microsoft.com/office/drawing/2014/main" id="{B84CFA06-281C-1BB8-D929-632EED88D285}"/>
+              </a:ext>
+            </a:extLst>
+          </p:cNvPr>
+          <p:cNvSpPr>
+            <a:spLocks noGrp="1"/>
+          </p:cNvSpPr>
+          <p:nvPr>
+            <p:ph type="ctrTitle"/>
+          </p:nvPr>
+        </p:nvSpPr>
+        <p:spPr/>
+        <p:txBody>
+          <a:bodyPr/>
+          <a:lstStyle/>
+          <a:p>
+            <a:r>
+              <a:rPr lang="de-DE" dirty="0"/>
+              <a:t>Warum brauchen wir Wettbewerb?</a:t>
+            </a:r>
+          </a:p>
+        </p:txBody>
+      </p:sp>
+      <p:sp>
+        <p:nvSpPr>
+          <p:cNvPr id="3" name="Subtitle 2">
+            <a:extLst>
+              <a:ext uri="{FF2B5EF4-FFF2-40B4-BE49-F238E27FC236}">
+                <a16:creationId xmlns:a16="http://schemas.microsoft.com/office/drawing/2014/main" id="{12AEE784-99A4-771C-F303-4987F6073675}"/>
+              </a:ext>
+            </a:extLst>
+          </p:cNvPr>
+          <p:cNvSpPr>
+            <a:spLocks noGrp="1"/>
+          </p:cNvSpPr>
+          <p:nvPr>
+            <p:ph type="subTitle" idx="1"/>
+          </p:nvPr>
+        </p:nvSpPr>
+        <p:spPr/>
+        <p:txBody>
+          <a:bodyPr/>
+          <a:lstStyle/>
+          <a:p>
+            <a:endParaRPr lang="de-DE"/>
+          </a:p>
+        </p:txBody>
+      </p:sp>
+      <p:sp>
+        <p:nvSpPr>
+          <p:cNvPr id="4" name="Date Placeholder 3">
+            <a:extLst>
+              <a:ext uri="{FF2B5EF4-FFF2-40B4-BE49-F238E27FC236}">
+                <a16:creationId xmlns:a16="http://schemas.microsoft.com/office/drawing/2014/main" id="{AD118D60-AE24-520D-F280-025EB9CFDEC5}"/>
+              </a:ext>
+            </a:extLst>
+          </p:cNvPr>
+          <p:cNvSpPr>
+            <a:spLocks noGrp="1"/>
+          </p:cNvSpPr>
+          <p:nvPr>
+            <p:ph type="dt" sz="half" idx="10"/>
+          </p:nvPr>
+        </p:nvSpPr>
+        <p:spPr/>
+        <p:txBody>
+          <a:bodyPr/>
+          <a:lstStyle/>
+          <a:p>
+            <a:pPr rtl="0"/>
+            <a:fld id="{D058F8EF-9461-4DB5-8DE8-65F0C8AF5E0D}" type="datetime1">
+              <a:rPr lang="de-DE" smtClean="0"/>
+              <a:t>21.11.2024</a:t>
+            </a:fld>
+            <a:endParaRPr lang="en-US" dirty="0"/>
+          </a:p>
+        </p:txBody>
+      </p:sp>
+    </p:spTree>
+    <p:extLst>
+      <p:ext uri="{BB962C8B-B14F-4D97-AF65-F5344CB8AC3E}">
+        <p14:creationId xmlns:p14="http://schemas.microsoft.com/office/powerpoint/2010/main" val="212380936"/>
+      </p:ext>
+    </p:extLst>
+  </p:cSld>
+  <p:clrMapOvr>
+    <a:masterClrMapping/>
+  </p:clrMapOvr>
+</p:sld>
+</file>
+
+<file path=ppt/slides/slide6.xml><?xml version="1.0" encoding="utf-8"?>
+<p:sld xmlns:a="http://schemas.openxmlformats.org/drawingml/2006/main" xmlns:r="http://schemas.openxmlformats.org/officeDocument/2006/relationships" xmlns:p="http://schemas.openxmlformats.org/presentationml/2006/main" show="0">
+  <p:cSld>
+    <p:spTree>
+      <p:nvGrpSpPr>
+        <p:cNvPr id="1" name=""/>
+        <p:cNvGrpSpPr/>
+        <p:nvPr/>
+      </p:nvGrpSpPr>
+      <p:grpSpPr>
+        <a:xfrm>
+          <a:off x="0" y="0"/>
+          <a:ext cx="0" cy="0"/>
+          <a:chOff x="0" y="0"/>
+          <a:chExt cx="0" cy="0"/>
+        </a:xfrm>
+      </p:grpSpPr>
+      <p:sp>
+        <p:nvSpPr>
+          <p:cNvPr id="2" name="Title 1">
+            <a:extLst>
+              <a:ext uri="{FF2B5EF4-FFF2-40B4-BE49-F238E27FC236}">
                 <a16:creationId xmlns:a16="http://schemas.microsoft.com/office/drawing/2014/main" id="{37C3AB17-93D5-D242-A4E6-7B21FB952DE3}"/>
               </a:ext>
             </a:extLst>
@@ -5364,7 +5516,7 @@
             <a:pPr rtl="0"/>
             <a:fld id="{CA5E3BD6-493E-4773-AC13-EE70A9E3F498}" type="datetime1">
               <a:rPr lang="de-DE" smtClean="0"/>
-              <a:t>15.11.2024</a:t>
+              <a:t>21.11.2024</a:t>
             </a:fld>
             <a:endParaRPr lang="en-US" dirty="0"/>
           </a:p>

</xml_diff>